<commit_message>
Changed Siri to Cortana... Ooops
</commit_message>
<xml_diff>
--- a/DeepDiveIntoDeepLearning.pptx
+++ b/DeepDiveIntoDeepLearning.pptx
@@ -4529,7 +4529,6 @@
               <a:rPr lang="en-GB" dirty="0" smtClean="0"/>
               <a:t>Consulting Data Scientist</a:t>
             </a:r>
-            <a:endParaRPr lang="en-GB" dirty="0" smtClean="0"/>
           </a:p>
           <a:p>
             <a:r>
@@ -6999,7 +6998,11 @@
           <a:p>
             <a:r>
               <a:rPr lang="en-GB" dirty="0" smtClean="0"/>
-              <a:t>Then… Siri.</a:t>
+              <a:t>Then… </a:t>
+            </a:r>
+            <a:r>
+              <a:rPr lang="en-GB" dirty="0" smtClean="0"/>
+              <a:t>Cortana.</a:t>
             </a:r>
             <a:endParaRPr lang="en-GB" dirty="0"/>
           </a:p>
@@ -7433,8 +7436,8 @@
         </p:nvSpPr>
         <p:spPr>
           <a:xfrm>
-            <a:off x="5352288" y="1846834"/>
-            <a:ext cx="5486400" cy="4351338"/>
+            <a:off x="5352287" y="1846834"/>
+            <a:ext cx="6521057" cy="4351338"/>
           </a:xfrm>
         </p:spPr>
         <p:txBody>
@@ -7451,21 +7454,9 @@
           <a:p>
             <a:r>
               <a:rPr lang="en-GB" dirty="0" smtClean="0"/>
-              <a:t>Microsoft MVP C#</a:t>
-            </a:r>
-          </a:p>
-          <a:p>
-            <a:r>
-              <a:rPr lang="en-GB" dirty="0" smtClean="0"/>
-              <a:t>Consulting Data Scientist</a:t>
+              <a:t>gary@duncodin.it</a:t>
             </a:r>
             <a:endParaRPr lang="en-GB" dirty="0" smtClean="0"/>
-          </a:p>
-          <a:p>
-            <a:r>
-              <a:rPr lang="en-GB" dirty="0" smtClean="0"/>
-              <a:t>gary@duncodin.it</a:t>
-            </a:r>
           </a:p>
           <a:p>
             <a:r>
@@ -7476,7 +7467,14 @@
               <a:rPr lang="en-GB" dirty="0" err="1" smtClean="0"/>
               <a:t>garyshort</a:t>
             </a:r>
-            <a:endParaRPr lang="en-GB" dirty="0"/>
+            <a:endParaRPr lang="en-GB" dirty="0" smtClean="0"/>
+          </a:p>
+          <a:p>
+            <a:r>
+              <a:rPr lang="en-GB" sz="2400" dirty="0"/>
+              <a:t>https://github.com/garyshort/DDDNorth2015.git</a:t>
+            </a:r>
+            <a:endParaRPr lang="en-GB" sz="2400" dirty="0"/>
           </a:p>
         </p:txBody>
       </p:sp>

</xml_diff>